<commit_message>
added the test data for the web services list
</commit_message>
<xml_diff>
--- a/docs/indic-wp_enhancements.pptx
+++ b/docs/indic-wp_enhancements.pptx
@@ -5,10 +5,10 @@
     <p:sldMasterId id="2147483651" r:id="rId1"/>
   </p:sldMasterIdLst>
   <p:notesMasterIdLst>
-    <p:notesMasterId r:id="rId13"/>
+    <p:notesMasterId r:id="rId14"/>
   </p:notesMasterIdLst>
   <p:handoutMasterIdLst>
-    <p:handoutMasterId r:id="rId14"/>
+    <p:handoutMasterId r:id="rId15"/>
   </p:handoutMasterIdLst>
   <p:sldIdLst>
     <p:sldId id="420" r:id="rId2"/>
@@ -16,17 +16,18 @@
     <p:sldId id="498" r:id="rId4"/>
     <p:sldId id="467" r:id="rId5"/>
     <p:sldId id="502" r:id="rId6"/>
-    <p:sldId id="496" r:id="rId7"/>
-    <p:sldId id="499" r:id="rId8"/>
-    <p:sldId id="500" r:id="rId9"/>
-    <p:sldId id="501" r:id="rId10"/>
-    <p:sldId id="503" r:id="rId11"/>
-    <p:sldId id="497" r:id="rId12"/>
+    <p:sldId id="504" r:id="rId7"/>
+    <p:sldId id="496" r:id="rId8"/>
+    <p:sldId id="499" r:id="rId9"/>
+    <p:sldId id="500" r:id="rId10"/>
+    <p:sldId id="501" r:id="rId11"/>
+    <p:sldId id="503" r:id="rId12"/>
+    <p:sldId id="497" r:id="rId13"/>
   </p:sldIdLst>
   <p:sldSz cx="9144000" cy="6858000" type="screen4x3"/>
   <p:notesSz cx="6991350" cy="9282113"/>
   <p:custDataLst>
-    <p:tags r:id="rId15"/>
+    <p:tags r:id="rId16"/>
   </p:custDataLst>
   <p:defaultTextStyle>
     <a:defPPr>
@@ -2449,6 +2450,198 @@
         <p:spPr>
           <a:xfrm>
             <a:off x="1066800" y="242739"/>
+            <a:ext cx="5184048" cy="461665"/>
+          </a:xfrm>
+          <a:prstGeom prst="rect">
+            <a:avLst/>
+          </a:prstGeom>
+        </p:spPr>
+        <p:txBody>
+          <a:bodyPr wrap="none">
+            <a:spAutoFit/>
+          </a:bodyPr>
+          <a:lstStyle/>
+          <a:p>
+            <a:r>
+              <a:rPr lang="en-US" b="1" dirty="0">
+                <a:solidFill>
+                  <a:schemeClr val="bg2"/>
+                </a:solidFill>
+              </a:rPr>
+              <a:t>API Testing through postman.com</a:t>
+            </a:r>
+            <a:endParaRPr lang="en-US" dirty="0">
+              <a:solidFill>
+                <a:schemeClr val="bg2"/>
+              </a:solidFill>
+            </a:endParaRPr>
+          </a:p>
+        </p:txBody>
+      </p:sp>
+      <p:sp>
+        <p:nvSpPr>
+          <p:cNvPr id="5" name="Rectangle 4">
+            <a:extLst>
+              <a:ext uri="{FF2B5EF4-FFF2-40B4-BE49-F238E27FC236}">
+                <a16:creationId xmlns:a16="http://schemas.microsoft.com/office/drawing/2014/main" id="{165FD9E1-680A-46C0-9486-86C2CCB8E70B}"/>
+              </a:ext>
+            </a:extLst>
+          </p:cNvPr>
+          <p:cNvSpPr/>
+          <p:nvPr/>
+        </p:nvSpPr>
+        <p:spPr>
+          <a:xfrm>
+            <a:off x="76200" y="1143000"/>
+            <a:ext cx="3860993" cy="461665"/>
+          </a:xfrm>
+          <a:prstGeom prst="rect">
+            <a:avLst/>
+          </a:prstGeom>
+        </p:spPr>
+        <p:txBody>
+          <a:bodyPr wrap="none">
+            <a:spAutoFit/>
+          </a:bodyPr>
+          <a:lstStyle/>
+          <a:p>
+            <a:r>
+              <a:rPr lang="en-US" dirty="0">
+                <a:solidFill>
+                  <a:schemeClr val="bg2"/>
+                </a:solidFill>
+                <a:hlinkClick r:id="rId2"/>
+              </a:rPr>
+              <a:t>https://www.postman.com/</a:t>
+            </a:r>
+            <a:r>
+              <a:rPr lang="en-US" dirty="0">
+                <a:solidFill>
+                  <a:schemeClr val="bg2"/>
+                </a:solidFill>
+              </a:rPr>
+              <a:t> </a:t>
+            </a:r>
+          </a:p>
+        </p:txBody>
+      </p:sp>
+      <p:pic>
+        <p:nvPicPr>
+          <p:cNvPr id="6" name="Picture 5">
+            <a:extLst>
+              <a:ext uri="{FF2B5EF4-FFF2-40B4-BE49-F238E27FC236}">
+                <a16:creationId xmlns:a16="http://schemas.microsoft.com/office/drawing/2014/main" id="{02FD30DE-0C45-4862-BB98-1C24FA8A49FB}"/>
+              </a:ext>
+            </a:extLst>
+          </p:cNvPr>
+          <p:cNvPicPr>
+            <a:picLocks noChangeAspect="1"/>
+          </p:cNvPicPr>
+          <p:nvPr/>
+        </p:nvPicPr>
+        <p:blipFill>
+          <a:blip r:embed="rId3"/>
+          <a:stretch>
+            <a:fillRect/>
+          </a:stretch>
+        </p:blipFill>
+        <p:spPr>
+          <a:xfrm>
+            <a:off x="-3928" y="2209800"/>
+            <a:ext cx="9144000" cy="3122341"/>
+          </a:xfrm>
+          <a:prstGeom prst="rect">
+            <a:avLst/>
+          </a:prstGeom>
+        </p:spPr>
+      </p:pic>
+    </p:spTree>
+    <p:extLst>
+      <p:ext uri="{BB962C8B-B14F-4D97-AF65-F5344CB8AC3E}">
+        <p14:creationId xmlns:p14="http://schemas.microsoft.com/office/powerpoint/2010/main" val="380984611"/>
+      </p:ext>
+    </p:extLst>
+  </p:cSld>
+  <p:clrMapOvr>
+    <a:masterClrMapping/>
+  </p:clrMapOvr>
+  <p:transition>
+    <p:wipe dir="r"/>
+  </p:transition>
+</p:sld>
+</file>
+
+<file path=ppt/slides/slide11.xml><?xml version="1.0" encoding="utf-8"?>
+<p:sld xmlns:a="http://schemas.openxmlformats.org/drawingml/2006/main" xmlns:r="http://schemas.openxmlformats.org/officeDocument/2006/relationships" xmlns:p="http://schemas.openxmlformats.org/presentationml/2006/main">
+  <p:cSld>
+    <p:spTree>
+      <p:nvGrpSpPr>
+        <p:cNvPr id="1" name=""/>
+        <p:cNvGrpSpPr/>
+        <p:nvPr/>
+      </p:nvGrpSpPr>
+      <p:grpSpPr>
+        <a:xfrm>
+          <a:off x="0" y="0"/>
+          <a:ext cx="0" cy="0"/>
+          <a:chOff x="0" y="0"/>
+          <a:chExt cx="0" cy="0"/>
+        </a:xfrm>
+      </p:grpSpPr>
+      <p:sp>
+        <p:nvSpPr>
+          <p:cNvPr id="2" name="Slide Number Placeholder 1">
+            <a:extLst>
+              <a:ext uri="{FF2B5EF4-FFF2-40B4-BE49-F238E27FC236}">
+                <a16:creationId xmlns:a16="http://schemas.microsoft.com/office/drawing/2014/main" id="{E7845A8E-C301-459F-A14D-028E56914551}"/>
+              </a:ext>
+            </a:extLst>
+          </p:cNvPr>
+          <p:cNvSpPr>
+            <a:spLocks noGrp="1"/>
+          </p:cNvSpPr>
+          <p:nvPr>
+            <p:ph type="sldNum" sz="quarter" idx="11"/>
+          </p:nvPr>
+        </p:nvSpPr>
+        <p:spPr/>
+        <p:txBody>
+          <a:bodyPr/>
+          <a:lstStyle/>
+          <a:p>
+            <a:pPr>
+              <a:defRPr/>
+            </a:pPr>
+            <a:fld id="{55707887-EE06-4E3F-9515-1ED64E674293}" type="slidenum">
+              <a:rPr lang="en-GB" smtClean="0"/>
+              <a:pPr>
+                <a:defRPr/>
+              </a:pPr>
+              <a:t>11</a:t>
+            </a:fld>
+            <a:endParaRPr lang="en-GB">
+              <a:solidFill>
+                <a:srgbClr val="FFFFFF"/>
+              </a:solidFill>
+            </a:endParaRPr>
+          </a:p>
+        </p:txBody>
+      </p:sp>
+      <p:sp>
+        <p:nvSpPr>
+          <p:cNvPr id="4" name="Rectangle 3">
+            <a:extLst>
+              <a:ext uri="{FF2B5EF4-FFF2-40B4-BE49-F238E27FC236}">
+                <a16:creationId xmlns:a16="http://schemas.microsoft.com/office/drawing/2014/main" id="{AB2473F2-D5A3-49F5-BE1D-A2CE4CD25079}"/>
+              </a:ext>
+            </a:extLst>
+          </p:cNvPr>
+          <p:cNvSpPr/>
+          <p:nvPr/>
+        </p:nvSpPr>
+        <p:spPr>
+          <a:xfrm>
+            <a:off x="1066800" y="242739"/>
             <a:ext cx="3207929" cy="461665"/>
           </a:xfrm>
           <a:prstGeom prst="rect">
@@ -2613,7 +2806,7 @@
 </p:sld>
 </file>
 
-<file path=ppt/slides/slide11.xml><?xml version="1.0" encoding="utf-8"?>
+<file path=ppt/slides/slide12.xml><?xml version="1.0" encoding="utf-8"?>
 <p:sld xmlns:a="http://schemas.openxmlformats.org/drawingml/2006/main" xmlns:r="http://schemas.openxmlformats.org/officeDocument/2006/relationships" xmlns:p="http://schemas.openxmlformats.org/presentationml/2006/main">
   <p:cSld>
     <p:spTree>
@@ -4120,7 +4313,7 @@
           </a:p>
           <a:p>
             <a:r>
-              <a:rPr lang="en-US" sz="1600" dirty="0">
+              <a:rPr lang="en-US" sz="1600" b="1" dirty="0">
                 <a:solidFill>
                   <a:schemeClr val="bg2"/>
                 </a:solidFill>
@@ -4134,7 +4327,7 @@
               <a:buChar char="•"/>
             </a:pPr>
             <a:r>
-              <a:rPr lang="en-US" sz="1600" dirty="0">
+              <a:rPr lang="en-US" sz="1600" b="1" dirty="0">
                 <a:solidFill>
                   <a:schemeClr val="bg2"/>
                 </a:solidFill>
@@ -4148,7 +4341,7 @@
               <a:buChar char="•"/>
             </a:pPr>
             <a:r>
-              <a:rPr lang="en-US" sz="1600" dirty="0">
+              <a:rPr lang="en-US" sz="1600" b="1" dirty="0">
                 <a:solidFill>
                   <a:schemeClr val="bg2"/>
                 </a:solidFill>
@@ -4269,79 +4462,112 @@
       </p:grpSpPr>
       <p:sp>
         <p:nvSpPr>
-          <p:cNvPr id="2" name="Slide Number Placeholder 1">
+          <p:cNvPr id="2" name="Rectangle 2">
             <a:extLst>
               <a:ext uri="{FF2B5EF4-FFF2-40B4-BE49-F238E27FC236}">
-                <a16:creationId xmlns:a16="http://schemas.microsoft.com/office/drawing/2014/main" id="{E7845A8E-C301-459F-A14D-028E56914551}"/>
+                <a16:creationId xmlns:a16="http://schemas.microsoft.com/office/drawing/2014/main" id="{78B07709-97CC-42A8-9B23-59FCDC8FAE05}"/>
               </a:ext>
             </a:extLst>
           </p:cNvPr>
           <p:cNvSpPr>
-            <a:spLocks noGrp="1"/>
+            <a:spLocks noChangeArrowheads="1"/>
           </p:cNvSpPr>
-          <p:nvPr>
-            <p:ph type="sldNum" sz="quarter" idx="11"/>
-          </p:nvPr>
+          <p:nvPr/>
         </p:nvSpPr>
-        <p:spPr/>
+        <p:spPr bwMode="auto">
+          <a:xfrm>
+            <a:off x="0" y="0"/>
+            <a:ext cx="9144000" cy="0"/>
+          </a:xfrm>
+          <a:prstGeom prst="rect">
+            <a:avLst/>
+          </a:prstGeom>
+          <a:noFill/>
+          <a:ln>
+            <a:noFill/>
+          </a:ln>
+          <a:effectLst>
+            <a:prstShdw prst="shdw17" dist="17961" dir="2700000">
+              <a:schemeClr val="accent1">
+                <a:gamma/>
+                <a:shade val="60000"/>
+                <a:invGamma/>
+              </a:schemeClr>
+            </a:prstShdw>
+          </a:effectLst>
+          <a:extLst>
+            <a:ext uri="{909E8E84-426E-40DD-AFC4-6F175D3DCCD1}">
+              <a14:hiddenFill xmlns:a14="http://schemas.microsoft.com/office/drawing/2010/main">
+                <a:solidFill>
+                  <a:schemeClr val="accent1"/>
+                </a:solidFill>
+              </a14:hiddenFill>
+            </a:ext>
+            <a:ext uri="{91240B29-F687-4F45-9708-019B960494DF}">
+              <a14:hiddenLine xmlns:a14="http://schemas.microsoft.com/office/drawing/2010/main" w="12700" cap="flat" cmpd="sng">
+                <a:solidFill>
+                  <a:schemeClr val="tx1"/>
+                </a:solidFill>
+                <a:prstDash val="solid"/>
+                <a:miter lim="800000"/>
+                <a:headEnd type="none" w="sm" len="sm"/>
+                <a:tailEnd type="none" w="sm" len="sm"/>
+              </a14:hiddenLine>
+            </a:ext>
+          </a:extLst>
+        </p:spPr>
         <p:txBody>
-          <a:bodyPr/>
+          <a:bodyPr wrap="none" anchor="ctr">
+            <a:spAutoFit/>
+          </a:bodyPr>
           <a:lstStyle/>
           <a:p>
             <a:pPr>
               <a:defRPr/>
             </a:pPr>
-            <a:fld id="{55707887-EE06-4E3F-9515-1ED64E674293}" type="slidenum">
-              <a:rPr lang="en-GB" smtClean="0"/>
-              <a:pPr>
-                <a:defRPr/>
-              </a:pPr>
-              <a:t>6</a:t>
-            </a:fld>
-            <a:endParaRPr lang="en-GB">
-              <a:solidFill>
-                <a:srgbClr val="FFFFFF"/>
-              </a:solidFill>
+            <a:endParaRPr lang="en-US">
+              <a:cs typeface="+mn-cs"/>
             </a:endParaRPr>
           </a:p>
         </p:txBody>
       </p:sp>
       <p:sp>
         <p:nvSpPr>
-          <p:cNvPr id="4" name="Rectangle 3">
+          <p:cNvPr id="6" name="TextBox 5">
             <a:extLst>
               <a:ext uri="{FF2B5EF4-FFF2-40B4-BE49-F238E27FC236}">
-                <a16:creationId xmlns:a16="http://schemas.microsoft.com/office/drawing/2014/main" id="{AB2473F2-D5A3-49F5-BE1D-A2CE4CD25079}"/>
+                <a16:creationId xmlns:a16="http://schemas.microsoft.com/office/drawing/2014/main" id="{7FB9AC0E-8734-4613-976B-11D0BEFFF939}"/>
               </a:ext>
             </a:extLst>
           </p:cNvPr>
-          <p:cNvSpPr/>
+          <p:cNvSpPr txBox="1"/>
           <p:nvPr/>
         </p:nvSpPr>
         <p:spPr>
           <a:xfrm>
-            <a:off x="1066800" y="242739"/>
-            <a:ext cx="4650440" cy="461665"/>
+            <a:off x="1066800" y="157742"/>
+            <a:ext cx="7992386" cy="584775"/>
           </a:xfrm>
           <a:prstGeom prst="rect">
             <a:avLst/>
           </a:prstGeom>
+          <a:noFill/>
         </p:spPr>
         <p:txBody>
-          <a:bodyPr wrap="none">
+          <a:bodyPr wrap="square" rtlCol="0">
             <a:spAutoFit/>
           </a:bodyPr>
           <a:lstStyle/>
           <a:p>
             <a:r>
-              <a:rPr lang="en-US" b="1" dirty="0">
-                <a:solidFill>
-                  <a:schemeClr val="bg2"/>
-                </a:solidFill>
-              </a:rPr>
-              <a:t>Walkthrough of the Code Base</a:t>
-            </a:r>
-            <a:endParaRPr lang="en-US" dirty="0">
+              <a:rPr lang="en-US" sz="3200" b="1" dirty="0">
+                <a:solidFill>
+                  <a:schemeClr val="bg2"/>
+                </a:solidFill>
+              </a:rPr>
+              <a:t>Typical use cases / Web Services</a:t>
+            </a:r>
+            <a:endParaRPr lang="en-US" sz="3200" dirty="0">
               <a:solidFill>
                 <a:schemeClr val="bg2"/>
               </a:solidFill>
@@ -4351,27 +4577,28 @@
       </p:sp>
       <p:sp>
         <p:nvSpPr>
-          <p:cNvPr id="5" name="Rectangle 4">
+          <p:cNvPr id="5" name="TextBox 4">
             <a:extLst>
               <a:ext uri="{FF2B5EF4-FFF2-40B4-BE49-F238E27FC236}">
-                <a16:creationId xmlns:a16="http://schemas.microsoft.com/office/drawing/2014/main" id="{EDEFA329-31AA-4C65-A3A3-A39239D1CAF1}"/>
+                <a16:creationId xmlns:a16="http://schemas.microsoft.com/office/drawing/2014/main" id="{9A62147A-50A0-48C5-A7A5-AF2497E61EB5}"/>
               </a:ext>
             </a:extLst>
           </p:cNvPr>
-          <p:cNvSpPr/>
+          <p:cNvSpPr txBox="1"/>
           <p:nvPr/>
         </p:nvSpPr>
         <p:spPr>
           <a:xfrm>
-            <a:off x="3831996" y="1371600"/>
-            <a:ext cx="5105400" cy="5016758"/>
+            <a:off x="228600" y="1066800"/>
+            <a:ext cx="8830586" cy="830997"/>
           </a:xfrm>
           <a:prstGeom prst="rect">
             <a:avLst/>
           </a:prstGeom>
+          <a:noFill/>
         </p:spPr>
         <p:txBody>
-          <a:bodyPr wrap="square">
+          <a:bodyPr wrap="square" rtlCol="0">
             <a:spAutoFit/>
           </a:bodyPr>
           <a:lstStyle/>
@@ -4382,39 +4609,7 @@
                   <a:schemeClr val="bg2"/>
                 </a:solidFill>
               </a:rPr>
-              <a:t>[1] Though the code mentions 4 </a:t>
-            </a:r>
-            <a:r>
-              <a:rPr lang="en-US" sz="1600" dirty="0" err="1">
-                <a:solidFill>
-                  <a:schemeClr val="bg2"/>
-                </a:solidFill>
-              </a:rPr>
-              <a:t>indic</a:t>
-            </a:r>
-            <a:r>
-              <a:rPr lang="en-US" sz="1600" dirty="0">
-                <a:solidFill>
-                  <a:schemeClr val="bg2"/>
-                </a:solidFill>
-              </a:rPr>
-              <a:t>-languages, only “</a:t>
-            </a:r>
-            <a:r>
-              <a:rPr lang="en-US" sz="1600" dirty="0" err="1">
-                <a:solidFill>
-                  <a:schemeClr val="bg2"/>
-                </a:solidFill>
-              </a:rPr>
-              <a:t>telugu_parser</a:t>
-            </a:r>
-            <a:r>
-              <a:rPr lang="en-US" sz="1600" dirty="0">
-                <a:solidFill>
-                  <a:schemeClr val="bg2"/>
-                </a:solidFill>
-              </a:rPr>
-              <a:t>” is functional.</a:t>
+              <a:t>[1] Given a string, parse that into LOGICAL characters</a:t>
             </a:r>
           </a:p>
           <a:p>
@@ -4431,145 +4626,22 @@
                   <a:schemeClr val="bg2"/>
                 </a:solidFill>
               </a:rPr>
-              <a:t>All others are not in the scope and are placeholders for future expansion.</a:t>
-            </a:r>
-          </a:p>
-          <a:p>
-            <a:endParaRPr lang="en-US" sz="1600" dirty="0">
-              <a:solidFill>
-                <a:schemeClr val="bg2"/>
-              </a:solidFill>
-            </a:endParaRPr>
-          </a:p>
-          <a:p>
-            <a:r>
-              <a:rPr lang="en-US" sz="1600" dirty="0">
-                <a:solidFill>
-                  <a:schemeClr val="bg2"/>
-                </a:solidFill>
-              </a:rPr>
-              <a:t>[2] All the yellow high-lighted files are test files and tools. These do not contribute to the functionality.</a:t>
-            </a:r>
-          </a:p>
-          <a:p>
-            <a:endParaRPr lang="en-US" sz="1600" dirty="0">
-              <a:solidFill>
-                <a:schemeClr val="bg2"/>
-              </a:solidFill>
-            </a:endParaRPr>
-          </a:p>
-          <a:p>
-            <a:r>
-              <a:rPr lang="en-US" sz="1600" dirty="0">
-                <a:solidFill>
-                  <a:schemeClr val="bg2"/>
-                </a:solidFill>
-              </a:rPr>
-              <a:t>[3] The two circled ones are the key files.</a:t>
-            </a:r>
-          </a:p>
-          <a:p>
-            <a:endParaRPr lang="en-US" sz="1600" dirty="0">
-              <a:solidFill>
-                <a:schemeClr val="bg2"/>
-              </a:solidFill>
-            </a:endParaRPr>
-          </a:p>
-          <a:p>
-            <a:r>
-              <a:rPr lang="en-US" sz="1600" dirty="0" err="1">
-                <a:solidFill>
-                  <a:schemeClr val="bg2"/>
-                </a:solidFill>
-              </a:rPr>
-              <a:t>Word_processor</a:t>
-            </a:r>
-            <a:r>
-              <a:rPr lang="en-US" sz="1600" dirty="0">
-                <a:solidFill>
-                  <a:schemeClr val="bg2"/>
-                </a:solidFill>
-              </a:rPr>
-              <a:t>: All the APIs are here. Based on the language, it delegates the responsibility to different parsers for parsing a given string into logical characters.</a:t>
-            </a:r>
-          </a:p>
-          <a:p>
-            <a:endParaRPr lang="en-US" sz="1600" dirty="0">
-              <a:solidFill>
-                <a:schemeClr val="bg2"/>
-              </a:solidFill>
-            </a:endParaRPr>
-          </a:p>
-          <a:p>
-            <a:r>
-              <a:rPr lang="en-US" sz="1600" dirty="0" err="1">
-                <a:solidFill>
-                  <a:schemeClr val="bg2"/>
-                </a:solidFill>
-              </a:rPr>
-              <a:t>telugu_parser.php</a:t>
-            </a:r>
-            <a:r>
-              <a:rPr lang="en-US" sz="1600" dirty="0">
-                <a:solidFill>
-                  <a:schemeClr val="bg2"/>
-                </a:solidFill>
-              </a:rPr>
-              <a:t> is one of the parsers that is functional now for processing “Telugu” language strings</a:t>
-            </a:r>
-          </a:p>
-          <a:p>
-            <a:endParaRPr lang="en-US" sz="1600" dirty="0">
-              <a:solidFill>
-                <a:schemeClr val="bg2"/>
-              </a:solidFill>
-            </a:endParaRPr>
+              <a:t>[2] Given a string, give me its length</a:t>
+            </a:r>
           </a:p>
         </p:txBody>
       </p:sp>
-      <p:pic>
-        <p:nvPicPr>
-          <p:cNvPr id="6" name="Picture 5">
-            <a:extLst>
-              <a:ext uri="{FF2B5EF4-FFF2-40B4-BE49-F238E27FC236}">
-                <a16:creationId xmlns:a16="http://schemas.microsoft.com/office/drawing/2014/main" id="{D5E23997-19D2-4A45-A4D8-B99E264A661D}"/>
-              </a:ext>
-            </a:extLst>
-          </p:cNvPr>
-          <p:cNvPicPr>
-            <a:picLocks noChangeAspect="1"/>
-          </p:cNvPicPr>
-          <p:nvPr/>
-        </p:nvPicPr>
-        <p:blipFill>
-          <a:blip r:embed="rId2"/>
-          <a:stretch>
-            <a:fillRect/>
-          </a:stretch>
-        </p:blipFill>
-        <p:spPr>
-          <a:xfrm>
-            <a:off x="228600" y="1371600"/>
-            <a:ext cx="3125758" cy="4891083"/>
-          </a:xfrm>
-          <a:prstGeom prst="rect">
-            <a:avLst/>
-          </a:prstGeom>
-        </p:spPr>
-      </p:pic>
     </p:spTree>
     <p:extLst>
       <p:ext uri="{BB962C8B-B14F-4D97-AF65-F5344CB8AC3E}">
-        <p14:creationId xmlns:p14="http://schemas.microsoft.com/office/powerpoint/2010/main" val="947737545"/>
+        <p14:creationId xmlns:p14="http://schemas.microsoft.com/office/powerpoint/2010/main" val="406978794"/>
       </p:ext>
     </p:extLst>
   </p:cSld>
   <p:clrMapOvr>
     <a:masterClrMapping/>
   </p:clrMapOvr>
-  <p:transition>
-    <p:wipe dir="r"/>
-  </p:transition>
+  <p:transition/>
 </p:sld>
 </file>
 
@@ -4644,7 +4716,7 @@
         <p:spPr>
           <a:xfrm>
             <a:off x="1066800" y="242739"/>
-            <a:ext cx="5657959" cy="461665"/>
+            <a:ext cx="4650440" cy="461665"/>
           </a:xfrm>
           <a:prstGeom prst="rect">
             <a:avLst/>
@@ -4662,7 +4734,7 @@
                   <a:schemeClr val="bg2"/>
                 </a:solidFill>
               </a:rPr>
-              <a:t>SOAP vs REST API: Some Resources</a:t>
+              <a:t>Walkthrough of the Code Base</a:t>
             </a:r>
             <a:endParaRPr lang="en-US" dirty="0">
               <a:solidFill>
@@ -4674,10 +4746,10 @@
       </p:sp>
       <p:sp>
         <p:nvSpPr>
-          <p:cNvPr id="3" name="Rectangle 2">
+          <p:cNvPr id="5" name="Rectangle 4">
             <a:extLst>
               <a:ext uri="{FF2B5EF4-FFF2-40B4-BE49-F238E27FC236}">
-                <a16:creationId xmlns:a16="http://schemas.microsoft.com/office/drawing/2014/main" id="{1122BAF2-C534-4064-AF9D-DFF707533F17}"/>
+                <a16:creationId xmlns:a16="http://schemas.microsoft.com/office/drawing/2014/main" id="{EDEFA329-31AA-4C65-A3A3-A39239D1CAF1}"/>
               </a:ext>
             </a:extLst>
           </p:cNvPr>
@@ -4686,8 +4758,8 @@
         </p:nvSpPr>
         <p:spPr>
           <a:xfrm>
-            <a:off x="152400" y="1524000"/>
-            <a:ext cx="8686800" cy="4154984"/>
+            <a:off x="3831996" y="1371600"/>
+            <a:ext cx="5105400" cy="5016758"/>
           </a:xfrm>
           <a:prstGeom prst="rect">
             <a:avLst/>
@@ -4700,16 +4772,48 @@
           <a:lstStyle/>
           <a:p>
             <a:r>
-              <a:rPr lang="en-US" b="1" dirty="0">
-                <a:solidFill>
-                  <a:schemeClr val="bg2"/>
-                </a:solidFill>
-              </a:rPr>
-              <a:t>SOAP Vs. REST: Difference between Web API Services</a:t>
-            </a:r>
-          </a:p>
-          <a:p>
-            <a:endParaRPr lang="en-US" sz="2000" dirty="0">
+              <a:rPr lang="en-US" sz="1600" dirty="0">
+                <a:solidFill>
+                  <a:schemeClr val="bg2"/>
+                </a:solidFill>
+              </a:rPr>
+              <a:t>[1] Though the code mentions 4 </a:t>
+            </a:r>
+            <a:r>
+              <a:rPr lang="en-US" sz="1600" dirty="0" err="1">
+                <a:solidFill>
+                  <a:schemeClr val="bg2"/>
+                </a:solidFill>
+              </a:rPr>
+              <a:t>indic</a:t>
+            </a:r>
+            <a:r>
+              <a:rPr lang="en-US" sz="1600" dirty="0">
+                <a:solidFill>
+                  <a:schemeClr val="bg2"/>
+                </a:solidFill>
+              </a:rPr>
+              <a:t>-languages, only “</a:t>
+            </a:r>
+            <a:r>
+              <a:rPr lang="en-US" sz="1600" dirty="0" err="1">
+                <a:solidFill>
+                  <a:schemeClr val="bg2"/>
+                </a:solidFill>
+              </a:rPr>
+              <a:t>telugu_parser</a:t>
+            </a:r>
+            <a:r>
+              <a:rPr lang="en-US" sz="1600" dirty="0">
+                <a:solidFill>
+                  <a:schemeClr val="bg2"/>
+                </a:solidFill>
+              </a:rPr>
+              <a:t>” is functional.</a:t>
+            </a:r>
+          </a:p>
+          <a:p>
+            <a:endParaRPr lang="en-US" sz="1600" dirty="0">
               <a:solidFill>
                 <a:schemeClr val="bg2"/>
               </a:solidFill>
@@ -4717,22 +4821,33 @@
           </a:p>
           <a:p>
             <a:r>
-              <a:rPr lang="en-US" sz="2000" dirty="0">
-                <a:solidFill>
-                  <a:schemeClr val="bg2"/>
-                </a:solidFill>
-                <a:hlinkClick r:id="rId2"/>
-              </a:rPr>
-              <a:t>https://www.guru99.com/comparison-between-web-services.html</a:t>
-            </a:r>
-            <a:endParaRPr lang="en-US" sz="2000" dirty="0">
+              <a:rPr lang="en-US" sz="1600" dirty="0">
+                <a:solidFill>
+                  <a:schemeClr val="bg2"/>
+                </a:solidFill>
+              </a:rPr>
+              <a:t>All others are not in the scope and are placeholders for future expansion.</a:t>
+            </a:r>
+          </a:p>
+          <a:p>
+            <a:endParaRPr lang="en-US" sz="1600" dirty="0">
               <a:solidFill>
                 <a:schemeClr val="bg2"/>
               </a:solidFill>
             </a:endParaRPr>
           </a:p>
           <a:p>
-            <a:endParaRPr lang="en-US" sz="2000" dirty="0">
+            <a:r>
+              <a:rPr lang="en-US" sz="1600" dirty="0">
+                <a:solidFill>
+                  <a:schemeClr val="bg2"/>
+                </a:solidFill>
+              </a:rPr>
+              <a:t>[2] All the yellow high-lighted files are test files and tools. These do not contribute to the functionality.</a:t>
+            </a:r>
+          </a:p>
+          <a:p>
+            <a:endParaRPr lang="en-US" sz="1600" dirty="0">
               <a:solidFill>
                 <a:schemeClr val="bg2"/>
               </a:solidFill>
@@ -4740,14 +4855,16 @@
           </a:p>
           <a:p>
             <a:r>
-              <a:rPr lang="en-US" sz="2000" b="1" dirty="0">
-                <a:solidFill>
-                  <a:schemeClr val="bg2"/>
-                </a:solidFill>
-              </a:rPr>
-              <a:t>SOAP vs REST?</a:t>
-            </a:r>
-            <a:endParaRPr lang="en-US" sz="2000" dirty="0">
+              <a:rPr lang="en-US" sz="1600" dirty="0">
+                <a:solidFill>
+                  <a:schemeClr val="bg2"/>
+                </a:solidFill>
+              </a:rPr>
+              <a:t>[3] The two circled ones are the key files.</a:t>
+            </a:r>
+          </a:p>
+          <a:p>
+            <a:endParaRPr lang="en-US" sz="1600" dirty="0">
               <a:solidFill>
                 <a:schemeClr val="bg2"/>
               </a:solidFill>
@@ -4755,102 +4872,90 @@
           </a:p>
           <a:p>
             <a:r>
-              <a:rPr lang="en-US" sz="2000" dirty="0">
-                <a:solidFill>
-                  <a:schemeClr val="bg2"/>
-                </a:solidFill>
-                <a:hlinkClick r:id="rId3"/>
-              </a:rPr>
-              <a:t>https://www.youtube.com/watch?v=bPNfu0IZhoE</a:t>
-            </a:r>
-            <a:endParaRPr lang="en-US" sz="2000" dirty="0">
+              <a:rPr lang="en-US" sz="1600" dirty="0" err="1">
+                <a:solidFill>
+                  <a:schemeClr val="bg2"/>
+                </a:solidFill>
+              </a:rPr>
+              <a:t>Word_processor</a:t>
+            </a:r>
+            <a:r>
+              <a:rPr lang="en-US" sz="1600" dirty="0">
+                <a:solidFill>
+                  <a:schemeClr val="bg2"/>
+                </a:solidFill>
+              </a:rPr>
+              <a:t>: All the APIs are here. Based on the language, it delegates the responsibility to different parsers for parsing a given string into logical characters.</a:t>
+            </a:r>
+          </a:p>
+          <a:p>
+            <a:endParaRPr lang="en-US" sz="1600" dirty="0">
               <a:solidFill>
                 <a:schemeClr val="bg2"/>
               </a:solidFill>
             </a:endParaRPr>
           </a:p>
           <a:p>
-            <a:endParaRPr lang="en-US" sz="2000" dirty="0">
+            <a:r>
+              <a:rPr lang="en-US" sz="1600" dirty="0" err="1">
+                <a:solidFill>
+                  <a:schemeClr val="bg2"/>
+                </a:solidFill>
+              </a:rPr>
+              <a:t>telugu_parser.php</a:t>
+            </a:r>
+            <a:r>
+              <a:rPr lang="en-US" sz="1600" dirty="0">
+                <a:solidFill>
+                  <a:schemeClr val="bg2"/>
+                </a:solidFill>
+              </a:rPr>
+              <a:t> is one of the parsers that is functional now for processing “Telugu” language strings</a:t>
+            </a:r>
+          </a:p>
+          <a:p>
+            <a:endParaRPr lang="en-US" sz="1600" dirty="0">
               <a:solidFill>
                 <a:schemeClr val="bg2"/>
               </a:solidFill>
             </a:endParaRPr>
           </a:p>
-          <a:p>
-            <a:endParaRPr lang="en-US" sz="2000" dirty="0">
-              <a:solidFill>
-                <a:schemeClr val="bg2"/>
-              </a:solidFill>
-            </a:endParaRPr>
-          </a:p>
-          <a:p>
-            <a:r>
-              <a:rPr lang="en-US" sz="2000" b="1" dirty="0">
-                <a:solidFill>
-                  <a:schemeClr val="bg2"/>
-                </a:solidFill>
-              </a:rPr>
-              <a:t>REST API Concepts</a:t>
-            </a:r>
-          </a:p>
-          <a:p>
-            <a:r>
-              <a:rPr lang="en-US" sz="2000" dirty="0">
-                <a:solidFill>
-                  <a:schemeClr val="bg2"/>
-                </a:solidFill>
-                <a:hlinkClick r:id="rId4"/>
-              </a:rPr>
-              <a:t>https://www.youtube.com/watch?v=7YcW25PHnAA</a:t>
-            </a:r>
-            <a:endParaRPr lang="en-US" sz="2000" dirty="0">
-              <a:solidFill>
-                <a:schemeClr val="bg2"/>
-              </a:solidFill>
-            </a:endParaRPr>
-          </a:p>
-          <a:p>
-            <a:endParaRPr lang="en-US" sz="2000" dirty="0">
-              <a:solidFill>
-                <a:schemeClr val="bg2"/>
-              </a:solidFill>
-            </a:endParaRPr>
-          </a:p>
-          <a:p>
-            <a:r>
-              <a:rPr lang="en-US" sz="2000" dirty="0">
-                <a:solidFill>
-                  <a:schemeClr val="bg2"/>
-                </a:solidFill>
-              </a:rPr>
-              <a:t>Programmable Web  (API Directory)</a:t>
-            </a:r>
-          </a:p>
-          <a:p>
-            <a:r>
-              <a:rPr lang="en-US" sz="2000" dirty="0">
-                <a:solidFill>
-                  <a:schemeClr val="bg2"/>
-                </a:solidFill>
-                <a:hlinkClick r:id="rId5"/>
-              </a:rPr>
-              <a:t>https://www.programmableweb.com/category/all/apis</a:t>
-            </a:r>
-            <a:r>
-              <a:rPr lang="en-US" sz="2000" dirty="0">
-                <a:solidFill>
-                  <a:schemeClr val="bg2"/>
-                </a:solidFill>
-              </a:rPr>
-              <a:t>  </a:t>
-            </a:r>
-          </a:p>
         </p:txBody>
       </p:sp>
+      <p:pic>
+        <p:nvPicPr>
+          <p:cNvPr id="6" name="Picture 5">
+            <a:extLst>
+              <a:ext uri="{FF2B5EF4-FFF2-40B4-BE49-F238E27FC236}">
+                <a16:creationId xmlns:a16="http://schemas.microsoft.com/office/drawing/2014/main" id="{D5E23997-19D2-4A45-A4D8-B99E264A661D}"/>
+              </a:ext>
+            </a:extLst>
+          </p:cNvPr>
+          <p:cNvPicPr>
+            <a:picLocks noChangeAspect="1"/>
+          </p:cNvPicPr>
+          <p:nvPr/>
+        </p:nvPicPr>
+        <p:blipFill>
+          <a:blip r:embed="rId2"/>
+          <a:stretch>
+            <a:fillRect/>
+          </a:stretch>
+        </p:blipFill>
+        <p:spPr>
+          <a:xfrm>
+            <a:off x="228600" y="1371600"/>
+            <a:ext cx="3125758" cy="4891083"/>
+          </a:xfrm>
+          <a:prstGeom prst="rect">
+            <a:avLst/>
+          </a:prstGeom>
+        </p:spPr>
+      </p:pic>
     </p:spTree>
     <p:extLst>
       <p:ext uri="{BB962C8B-B14F-4D97-AF65-F5344CB8AC3E}">
-        <p14:creationId xmlns:p14="http://schemas.microsoft.com/office/powerpoint/2010/main" val="1795380400"/>
+        <p14:creationId xmlns:p14="http://schemas.microsoft.com/office/powerpoint/2010/main" val="947737545"/>
       </p:ext>
     </p:extLst>
   </p:cSld>
@@ -4934,7 +5039,7 @@
         <p:spPr>
           <a:xfrm>
             <a:off x="1066800" y="242739"/>
-            <a:ext cx="4841005" cy="461665"/>
+            <a:ext cx="5657959" cy="461665"/>
           </a:xfrm>
           <a:prstGeom prst="rect">
             <a:avLst/>
@@ -4952,7 +5057,7 @@
                   <a:schemeClr val="bg2"/>
                 </a:solidFill>
               </a:rPr>
-              <a:t>API Testing through reqbin.com</a:t>
+              <a:t>SOAP vs REST API: Some Resources</a:t>
             </a:r>
             <a:endParaRPr lang="en-US" dirty="0">
               <a:solidFill>
@@ -4962,40 +5067,185 @@
           </a:p>
         </p:txBody>
       </p:sp>
-      <p:pic>
-        <p:nvPicPr>
-          <p:cNvPr id="3" name="Picture 2">
+      <p:sp>
+        <p:nvSpPr>
+          <p:cNvPr id="3" name="Rectangle 2">
             <a:extLst>
               <a:ext uri="{FF2B5EF4-FFF2-40B4-BE49-F238E27FC236}">
-                <a16:creationId xmlns:a16="http://schemas.microsoft.com/office/drawing/2014/main" id="{3AFDDDDE-78F5-4317-89A1-16B988105A51}"/>
+                <a16:creationId xmlns:a16="http://schemas.microsoft.com/office/drawing/2014/main" id="{1122BAF2-C534-4064-AF9D-DFF707533F17}"/>
               </a:ext>
             </a:extLst>
           </p:cNvPr>
-          <p:cNvPicPr>
-            <a:picLocks noChangeAspect="1"/>
-          </p:cNvPicPr>
+          <p:cNvSpPr/>
           <p:nvPr/>
-        </p:nvPicPr>
-        <p:blipFill>
-          <a:blip r:embed="rId2"/>
-          <a:stretch>
-            <a:fillRect/>
-          </a:stretch>
-        </p:blipFill>
+        </p:nvSpPr>
         <p:spPr>
           <a:xfrm>
-            <a:off x="-10998" y="2286000"/>
-            <a:ext cx="9144000" cy="4028194"/>
+            <a:off x="152400" y="1524000"/>
+            <a:ext cx="8686800" cy="4154984"/>
           </a:xfrm>
           <a:prstGeom prst="rect">
             <a:avLst/>
           </a:prstGeom>
         </p:spPr>
-      </p:pic>
+        <p:txBody>
+          <a:bodyPr wrap="square">
+            <a:spAutoFit/>
+          </a:bodyPr>
+          <a:lstStyle/>
+          <a:p>
+            <a:r>
+              <a:rPr lang="en-US" b="1" dirty="0">
+                <a:solidFill>
+                  <a:schemeClr val="bg2"/>
+                </a:solidFill>
+              </a:rPr>
+              <a:t>SOAP Vs. REST: Difference between Web API Services</a:t>
+            </a:r>
+          </a:p>
+          <a:p>
+            <a:endParaRPr lang="en-US" sz="2000" dirty="0">
+              <a:solidFill>
+                <a:schemeClr val="bg2"/>
+              </a:solidFill>
+            </a:endParaRPr>
+          </a:p>
+          <a:p>
+            <a:r>
+              <a:rPr lang="en-US" sz="2000" dirty="0">
+                <a:solidFill>
+                  <a:schemeClr val="bg2"/>
+                </a:solidFill>
+                <a:hlinkClick r:id="rId2"/>
+              </a:rPr>
+              <a:t>https://www.guru99.com/comparison-between-web-services.html</a:t>
+            </a:r>
+            <a:endParaRPr lang="en-US" sz="2000" dirty="0">
+              <a:solidFill>
+                <a:schemeClr val="bg2"/>
+              </a:solidFill>
+            </a:endParaRPr>
+          </a:p>
+          <a:p>
+            <a:endParaRPr lang="en-US" sz="2000" dirty="0">
+              <a:solidFill>
+                <a:schemeClr val="bg2"/>
+              </a:solidFill>
+            </a:endParaRPr>
+          </a:p>
+          <a:p>
+            <a:r>
+              <a:rPr lang="en-US" sz="2000" b="1" dirty="0">
+                <a:solidFill>
+                  <a:schemeClr val="bg2"/>
+                </a:solidFill>
+              </a:rPr>
+              <a:t>SOAP vs REST?</a:t>
+            </a:r>
+            <a:endParaRPr lang="en-US" sz="2000" dirty="0">
+              <a:solidFill>
+                <a:schemeClr val="bg2"/>
+              </a:solidFill>
+            </a:endParaRPr>
+          </a:p>
+          <a:p>
+            <a:r>
+              <a:rPr lang="en-US" sz="2000" dirty="0">
+                <a:solidFill>
+                  <a:schemeClr val="bg2"/>
+                </a:solidFill>
+                <a:hlinkClick r:id="rId3"/>
+              </a:rPr>
+              <a:t>https://www.youtube.com/watch?v=bPNfu0IZhoE</a:t>
+            </a:r>
+            <a:endParaRPr lang="en-US" sz="2000" dirty="0">
+              <a:solidFill>
+                <a:schemeClr val="bg2"/>
+              </a:solidFill>
+            </a:endParaRPr>
+          </a:p>
+          <a:p>
+            <a:endParaRPr lang="en-US" sz="2000" dirty="0">
+              <a:solidFill>
+                <a:schemeClr val="bg2"/>
+              </a:solidFill>
+            </a:endParaRPr>
+          </a:p>
+          <a:p>
+            <a:endParaRPr lang="en-US" sz="2000" dirty="0">
+              <a:solidFill>
+                <a:schemeClr val="bg2"/>
+              </a:solidFill>
+            </a:endParaRPr>
+          </a:p>
+          <a:p>
+            <a:r>
+              <a:rPr lang="en-US" sz="2000" b="1" dirty="0">
+                <a:solidFill>
+                  <a:schemeClr val="bg2"/>
+                </a:solidFill>
+              </a:rPr>
+              <a:t>REST API Concepts</a:t>
+            </a:r>
+          </a:p>
+          <a:p>
+            <a:r>
+              <a:rPr lang="en-US" sz="2000" dirty="0">
+                <a:solidFill>
+                  <a:schemeClr val="bg2"/>
+                </a:solidFill>
+                <a:hlinkClick r:id="rId4"/>
+              </a:rPr>
+              <a:t>https://www.youtube.com/watch?v=7YcW25PHnAA</a:t>
+            </a:r>
+            <a:endParaRPr lang="en-US" sz="2000" dirty="0">
+              <a:solidFill>
+                <a:schemeClr val="bg2"/>
+              </a:solidFill>
+            </a:endParaRPr>
+          </a:p>
+          <a:p>
+            <a:endParaRPr lang="en-US" sz="2000" dirty="0">
+              <a:solidFill>
+                <a:schemeClr val="bg2"/>
+              </a:solidFill>
+            </a:endParaRPr>
+          </a:p>
+          <a:p>
+            <a:r>
+              <a:rPr lang="en-US" sz="2000" dirty="0">
+                <a:solidFill>
+                  <a:schemeClr val="bg2"/>
+                </a:solidFill>
+              </a:rPr>
+              <a:t>Programmable Web  (API Directory)</a:t>
+            </a:r>
+          </a:p>
+          <a:p>
+            <a:r>
+              <a:rPr lang="en-US" sz="2000" dirty="0">
+                <a:solidFill>
+                  <a:schemeClr val="bg2"/>
+                </a:solidFill>
+                <a:hlinkClick r:id="rId5"/>
+              </a:rPr>
+              <a:t>https://www.programmableweb.com/category/all/apis</a:t>
+            </a:r>
+            <a:r>
+              <a:rPr lang="en-US" sz="2000" dirty="0">
+                <a:solidFill>
+                  <a:schemeClr val="bg2"/>
+                </a:solidFill>
+              </a:rPr>
+              <a:t>  </a:t>
+            </a:r>
+          </a:p>
+        </p:txBody>
+      </p:sp>
     </p:spTree>
     <p:extLst>
       <p:ext uri="{BB962C8B-B14F-4D97-AF65-F5344CB8AC3E}">
-        <p14:creationId xmlns:p14="http://schemas.microsoft.com/office/powerpoint/2010/main" val="45417544"/>
+        <p14:creationId xmlns:p14="http://schemas.microsoft.com/office/powerpoint/2010/main" val="1795380400"/>
       </p:ext>
     </p:extLst>
   </p:cSld>
@@ -5079,7 +5329,7 @@
         <p:spPr>
           <a:xfrm>
             <a:off x="1066800" y="242739"/>
-            <a:ext cx="5184048" cy="461665"/>
+            <a:ext cx="4841005" cy="461665"/>
           </a:xfrm>
           <a:prstGeom prst="rect">
             <a:avLst/>
@@ -5097,7 +5347,7 @@
                   <a:schemeClr val="bg2"/>
                 </a:solidFill>
               </a:rPr>
-              <a:t>API Testing through postman.com</a:t>
+              <a:t>API Testing through reqbin.com</a:t>
             </a:r>
             <a:endParaRPr lang="en-US" dirty="0">
               <a:solidFill>
@@ -5107,59 +5357,12 @@
           </a:p>
         </p:txBody>
       </p:sp>
-      <p:sp>
-        <p:nvSpPr>
-          <p:cNvPr id="5" name="Rectangle 4">
+      <p:pic>
+        <p:nvPicPr>
+          <p:cNvPr id="3" name="Picture 2">
             <a:extLst>
               <a:ext uri="{FF2B5EF4-FFF2-40B4-BE49-F238E27FC236}">
-                <a16:creationId xmlns:a16="http://schemas.microsoft.com/office/drawing/2014/main" id="{165FD9E1-680A-46C0-9486-86C2CCB8E70B}"/>
-              </a:ext>
-            </a:extLst>
-          </p:cNvPr>
-          <p:cNvSpPr/>
-          <p:nvPr/>
-        </p:nvSpPr>
-        <p:spPr>
-          <a:xfrm>
-            <a:off x="76200" y="1143000"/>
-            <a:ext cx="3860993" cy="461665"/>
-          </a:xfrm>
-          <a:prstGeom prst="rect">
-            <a:avLst/>
-          </a:prstGeom>
-        </p:spPr>
-        <p:txBody>
-          <a:bodyPr wrap="none">
-            <a:spAutoFit/>
-          </a:bodyPr>
-          <a:lstStyle/>
-          <a:p>
-            <a:r>
-              <a:rPr lang="en-US" dirty="0">
-                <a:solidFill>
-                  <a:schemeClr val="bg2"/>
-                </a:solidFill>
-                <a:hlinkClick r:id="rId2"/>
-              </a:rPr>
-              <a:t>https://www.postman.com/</a:t>
-            </a:r>
-            <a:r>
-              <a:rPr lang="en-US" dirty="0">
-                <a:solidFill>
-                  <a:schemeClr val="bg2"/>
-                </a:solidFill>
-              </a:rPr>
-              <a:t> </a:t>
-            </a:r>
-          </a:p>
-        </p:txBody>
-      </p:sp>
-      <p:pic>
-        <p:nvPicPr>
-          <p:cNvPr id="6" name="Picture 5">
-            <a:extLst>
-              <a:ext uri="{FF2B5EF4-FFF2-40B4-BE49-F238E27FC236}">
-                <a16:creationId xmlns:a16="http://schemas.microsoft.com/office/drawing/2014/main" id="{02FD30DE-0C45-4862-BB98-1C24FA8A49FB}"/>
+                <a16:creationId xmlns:a16="http://schemas.microsoft.com/office/drawing/2014/main" id="{3AFDDDDE-78F5-4317-89A1-16B988105A51}"/>
               </a:ext>
             </a:extLst>
           </p:cNvPr>
@@ -5169,15 +5372,15 @@
           <p:nvPr/>
         </p:nvPicPr>
         <p:blipFill>
-          <a:blip r:embed="rId3"/>
+          <a:blip r:embed="rId2"/>
           <a:stretch>
             <a:fillRect/>
           </a:stretch>
         </p:blipFill>
         <p:spPr>
           <a:xfrm>
-            <a:off x="-3928" y="2209800"/>
-            <a:ext cx="9144000" cy="3122341"/>
+            <a:off x="-10998" y="2286000"/>
+            <a:ext cx="9144000" cy="4028194"/>
           </a:xfrm>
           <a:prstGeom prst="rect">
             <a:avLst/>
@@ -5187,7 +5390,7 @@
     </p:spTree>
     <p:extLst>
       <p:ext uri="{BB962C8B-B14F-4D97-AF65-F5344CB8AC3E}">
-        <p14:creationId xmlns:p14="http://schemas.microsoft.com/office/powerpoint/2010/main" val="380984611"/>
+        <p14:creationId xmlns:p14="http://schemas.microsoft.com/office/powerpoint/2010/main" val="45417544"/>
       </p:ext>
     </p:extLst>
   </p:cSld>

</xml_diff>